<commit_message>
Updating flask app slide
</commit_message>
<xml_diff>
--- a/Slides/Capstone - Review Ranker.pptx
+++ b/Slides/Capstone - Review Ranker.pptx
@@ -26146,7 +26146,23 @@
             </a:pPr>
             <a:r>
               <a:rPr lang="en-US" sz="2000" kern="1200" dirty="0"/>
-              <a:t>User has to copy and paste the review into the website</a:t>
+              <a:t>User has to copy and paste </a:t>
+            </a:r>
+            <a:r>
+              <a:rPr lang="en-US" sz="2000" kern="1200"/>
+              <a:t>the </a:t>
+            </a:r>
+            <a:r>
+              <a:rPr lang="en-US" sz="2000"/>
+              <a:t>product URL</a:t>
+            </a:r>
+            <a:r>
+              <a:rPr lang="en-US" sz="2000" kern="1200"/>
+              <a:t> </a:t>
+            </a:r>
+            <a:r>
+              <a:rPr lang="en-US" sz="2000" kern="1200" dirty="0"/>
+              <a:t>into the website</a:t>
             </a:r>
             <a:endParaRPr lang="en-IN" sz="2000" kern="1200" dirty="0"/>
           </a:p>

</xml_diff>

<commit_message>
Changes to feature slides
</commit_message>
<xml_diff>
--- a/Slides/Capstone - Review Ranker.pptx
+++ b/Slides/Capstone - Review Ranker.pptx
@@ -309,7 +309,7 @@
           <a:p>
             <a:fld id="{F8C14F65-89A5-42E9-B468-CE9CAEF9B299}" type="datetimeFigureOut">
               <a:rPr lang="en-IN" smtClean="0"/>
-              <a:t>23-04-2020</a:t>
+              <a:t>24-04-2020</a:t>
             </a:fld>
             <a:endParaRPr lang="en-IN"/>
           </a:p>
@@ -835,7 +835,7 @@
           <a:p>
             <a:fld id="{875039C1-C8F9-4D74-8F14-B9E9E01DD050}" type="datetimeFigureOut">
               <a:rPr lang="en-IN" smtClean="0"/>
-              <a:t>23-04-2020</a:t>
+              <a:t>24-04-2020</a:t>
             </a:fld>
             <a:endParaRPr lang="en-IN"/>
           </a:p>
@@ -1038,7 +1038,7 @@
           <a:p>
             <a:fld id="{875039C1-C8F9-4D74-8F14-B9E9E01DD050}" type="datetimeFigureOut">
               <a:rPr lang="en-IN" smtClean="0"/>
-              <a:t>23-04-2020</a:t>
+              <a:t>24-04-2020</a:t>
             </a:fld>
             <a:endParaRPr lang="en-IN"/>
           </a:p>
@@ -1251,7 +1251,7 @@
           <a:p>
             <a:fld id="{875039C1-C8F9-4D74-8F14-B9E9E01DD050}" type="datetimeFigureOut">
               <a:rPr lang="en-IN" smtClean="0"/>
-              <a:t>23-04-2020</a:t>
+              <a:t>24-04-2020</a:t>
             </a:fld>
             <a:endParaRPr lang="en-IN"/>
           </a:p>
@@ -1454,7 +1454,7 @@
           <a:p>
             <a:fld id="{875039C1-C8F9-4D74-8F14-B9E9E01DD050}" type="datetimeFigureOut">
               <a:rPr lang="en-IN" smtClean="0"/>
-              <a:t>23-04-2020</a:t>
+              <a:t>24-04-2020</a:t>
             </a:fld>
             <a:endParaRPr lang="en-IN"/>
           </a:p>
@@ -1733,7 +1733,7 @@
           <a:p>
             <a:fld id="{875039C1-C8F9-4D74-8F14-B9E9E01DD050}" type="datetimeFigureOut">
               <a:rPr lang="en-IN" smtClean="0"/>
-              <a:t>23-04-2020</a:t>
+              <a:t>24-04-2020</a:t>
             </a:fld>
             <a:endParaRPr lang="en-IN"/>
           </a:p>
@@ -2004,7 +2004,7 @@
           <a:p>
             <a:fld id="{875039C1-C8F9-4D74-8F14-B9E9E01DD050}" type="datetimeFigureOut">
               <a:rPr lang="en-IN" smtClean="0"/>
-              <a:t>23-04-2020</a:t>
+              <a:t>24-04-2020</a:t>
             </a:fld>
             <a:endParaRPr lang="en-IN"/>
           </a:p>
@@ -2422,7 +2422,7 @@
           <a:p>
             <a:fld id="{875039C1-C8F9-4D74-8F14-B9E9E01DD050}" type="datetimeFigureOut">
               <a:rPr lang="en-IN" smtClean="0"/>
-              <a:t>23-04-2020</a:t>
+              <a:t>24-04-2020</a:t>
             </a:fld>
             <a:endParaRPr lang="en-IN"/>
           </a:p>
@@ -2567,7 +2567,7 @@
           <a:p>
             <a:fld id="{875039C1-C8F9-4D74-8F14-B9E9E01DD050}" type="datetimeFigureOut">
               <a:rPr lang="en-IN" smtClean="0"/>
-              <a:t>23-04-2020</a:t>
+              <a:t>24-04-2020</a:t>
             </a:fld>
             <a:endParaRPr lang="en-IN"/>
           </a:p>
@@ -2683,7 +2683,7 @@
           <a:p>
             <a:fld id="{875039C1-C8F9-4D74-8F14-B9E9E01DD050}" type="datetimeFigureOut">
               <a:rPr lang="en-IN" smtClean="0"/>
-              <a:t>23-04-2020</a:t>
+              <a:t>24-04-2020</a:t>
             </a:fld>
             <a:endParaRPr lang="en-IN"/>
           </a:p>
@@ -2999,7 +2999,7 @@
           <a:p>
             <a:fld id="{875039C1-C8F9-4D74-8F14-B9E9E01DD050}" type="datetimeFigureOut">
               <a:rPr lang="en-IN" smtClean="0"/>
-              <a:t>23-04-2020</a:t>
+              <a:t>24-04-2020</a:t>
             </a:fld>
             <a:endParaRPr lang="en-IN"/>
           </a:p>
@@ -3291,7 +3291,7 @@
           <a:p>
             <a:fld id="{875039C1-C8F9-4D74-8F14-B9E9E01DD050}" type="datetimeFigureOut">
               <a:rPr lang="en-IN" smtClean="0"/>
-              <a:t>23-04-2020</a:t>
+              <a:t>24-04-2020</a:t>
             </a:fld>
             <a:endParaRPr lang="en-IN"/>
           </a:p>
@@ -3537,7 +3537,7 @@
           <a:p>
             <a:fld id="{875039C1-C8F9-4D74-8F14-B9E9E01DD050}" type="datetimeFigureOut">
               <a:rPr lang="en-IN" smtClean="0"/>
-              <a:t>23-04-2020</a:t>
+              <a:t>24-04-2020</a:t>
             </a:fld>
             <a:endParaRPr lang="en-IN"/>
           </a:p>
@@ -22063,7 +22063,7 @@
             </a:pPr>
             <a:r>
               <a:rPr lang="en-US" sz="3100" kern="1200" dirty="0"/>
-              <a:t>Review Text ,Review Rating &amp; Number of Sentence were the features used.</a:t>
+              <a:t>Review Text ,Number of Photos, Number of Sentence, Percent Adjective were the features used.</a:t>
             </a:r>
             <a:endParaRPr lang="en-IN" sz="3100" kern="1200" dirty="0"/>
           </a:p>

</xml_diff>